<commit_message>
update code with Olejak
</commit_message>
<xml_diff>
--- a/plottingCode/Fig_comparison/FormationRates_BHBH_maxsorted_versionLRR_withLabels.pptx
+++ b/plottingCode/Fig_comparison/FormationRates_BHBH_maxsorted_versionLRR_withLabels.pptx
@@ -254,7 +254,7 @@
           <a:p>
             <a:fld id="{6A7F7635-3F2B-034B-8DE6-1CDFFFC74B96}" type="datetimeFigureOut">
               <a:rPr lang="en-US" smtClean="0"/>
-              <a:t>10/12/22</a:t>
+              <a:t>11/9/22</a:t>
             </a:fld>
             <a:endParaRPr lang="en-US"/>
           </a:p>
@@ -424,7 +424,7 @@
           <a:p>
             <a:fld id="{6A7F7635-3F2B-034B-8DE6-1CDFFFC74B96}" type="datetimeFigureOut">
               <a:rPr lang="en-US" smtClean="0"/>
-              <a:t>10/12/22</a:t>
+              <a:t>11/9/22</a:t>
             </a:fld>
             <a:endParaRPr lang="en-US"/>
           </a:p>
@@ -604,7 +604,7 @@
           <a:p>
             <a:fld id="{6A7F7635-3F2B-034B-8DE6-1CDFFFC74B96}" type="datetimeFigureOut">
               <a:rPr lang="en-US" smtClean="0"/>
-              <a:t>10/12/22</a:t>
+              <a:t>11/9/22</a:t>
             </a:fld>
             <a:endParaRPr lang="en-US"/>
           </a:p>
@@ -774,7 +774,7 @@
           <a:p>
             <a:fld id="{6A7F7635-3F2B-034B-8DE6-1CDFFFC74B96}" type="datetimeFigureOut">
               <a:rPr lang="en-US" smtClean="0"/>
-              <a:t>10/12/22</a:t>
+              <a:t>11/9/22</a:t>
             </a:fld>
             <a:endParaRPr lang="en-US"/>
           </a:p>
@@ -1018,7 +1018,7 @@
           <a:p>
             <a:fld id="{6A7F7635-3F2B-034B-8DE6-1CDFFFC74B96}" type="datetimeFigureOut">
               <a:rPr lang="en-US" smtClean="0"/>
-              <a:t>10/12/22</a:t>
+              <a:t>11/9/22</a:t>
             </a:fld>
             <a:endParaRPr lang="en-US"/>
           </a:p>
@@ -1250,7 +1250,7 @@
           <a:p>
             <a:fld id="{6A7F7635-3F2B-034B-8DE6-1CDFFFC74B96}" type="datetimeFigureOut">
               <a:rPr lang="en-US" smtClean="0"/>
-              <a:t>10/12/22</a:t>
+              <a:t>11/9/22</a:t>
             </a:fld>
             <a:endParaRPr lang="en-US"/>
           </a:p>
@@ -1617,7 +1617,7 @@
           <a:p>
             <a:fld id="{6A7F7635-3F2B-034B-8DE6-1CDFFFC74B96}" type="datetimeFigureOut">
               <a:rPr lang="en-US" smtClean="0"/>
-              <a:t>10/12/22</a:t>
+              <a:t>11/9/22</a:t>
             </a:fld>
             <a:endParaRPr lang="en-US"/>
           </a:p>
@@ -1735,7 +1735,7 @@
           <a:p>
             <a:fld id="{6A7F7635-3F2B-034B-8DE6-1CDFFFC74B96}" type="datetimeFigureOut">
               <a:rPr lang="en-US" smtClean="0"/>
-              <a:t>10/12/22</a:t>
+              <a:t>11/9/22</a:t>
             </a:fld>
             <a:endParaRPr lang="en-US"/>
           </a:p>
@@ -1830,7 +1830,7 @@
           <a:p>
             <a:fld id="{6A7F7635-3F2B-034B-8DE6-1CDFFFC74B96}" type="datetimeFigureOut">
               <a:rPr lang="en-US" smtClean="0"/>
-              <a:t>10/12/22</a:t>
+              <a:t>11/9/22</a:t>
             </a:fld>
             <a:endParaRPr lang="en-US"/>
           </a:p>
@@ -2107,7 +2107,7 @@
           <a:p>
             <a:fld id="{6A7F7635-3F2B-034B-8DE6-1CDFFFC74B96}" type="datetimeFigureOut">
               <a:rPr lang="en-US" smtClean="0"/>
-              <a:t>10/12/22</a:t>
+              <a:t>11/9/22</a:t>
             </a:fld>
             <a:endParaRPr lang="en-US"/>
           </a:p>
@@ -2364,7 +2364,7 @@
           <a:p>
             <a:fld id="{6A7F7635-3F2B-034B-8DE6-1CDFFFC74B96}" type="datetimeFigureOut">
               <a:rPr lang="en-US" smtClean="0"/>
-              <a:t>10/12/22</a:t>
+              <a:t>11/9/22</a:t>
             </a:fld>
             <a:endParaRPr lang="en-US"/>
           </a:p>
@@ -2577,7 +2577,7 @@
           <a:p>
             <a:fld id="{6A7F7635-3F2B-034B-8DE6-1CDFFFC74B96}" type="datetimeFigureOut">
               <a:rPr lang="en-US" smtClean="0"/>
-              <a:t>10/12/22</a:t>
+              <a:t>11/9/22</a:t>
             </a:fld>
             <a:endParaRPr lang="en-US"/>
           </a:p>
@@ -2984,36 +2984,6 @@
       </p:grpSpPr>
       <p:pic>
         <p:nvPicPr>
-          <p:cNvPr id="3" name="Picture 2">
-            <a:extLst>
-              <a:ext uri="{FF2B5EF4-FFF2-40B4-BE49-F238E27FC236}">
-                <a16:creationId xmlns:a16="http://schemas.microsoft.com/office/drawing/2014/main" id="{080AEA72-D9BC-9A72-0517-CDF4447F6176}"/>
-              </a:ext>
-            </a:extLst>
-          </p:cNvPr>
-          <p:cNvPicPr>
-            <a:picLocks noChangeAspect="1"/>
-          </p:cNvPicPr>
-          <p:nvPr/>
-        </p:nvPicPr>
-        <p:blipFill>
-          <a:blip r:embed="rId2"/>
-          <a:stretch>
-            <a:fillRect/>
-          </a:stretch>
-        </p:blipFill>
-        <p:spPr>
-          <a:xfrm>
-            <a:off x="0" y="679921"/>
-            <a:ext cx="6858000" cy="6035040"/>
-          </a:xfrm>
-          <a:prstGeom prst="rect">
-            <a:avLst/>
-          </a:prstGeom>
-        </p:spPr>
-      </p:pic>
-      <p:pic>
-        <p:nvPicPr>
           <p:cNvPr id="6" name="Picture 5" descr="A screenshot of a computer&#10;&#10;Description automatically generated with low confidence">
             <a:extLst>
               <a:ext uri="{FF2B5EF4-FFF2-40B4-BE49-F238E27FC236}">
@@ -3027,7 +2997,7 @@
           <p:nvPr/>
         </p:nvPicPr>
         <p:blipFill rotWithShape="1">
-          <a:blip r:embed="rId3"/>
+          <a:blip r:embed="rId2"/>
           <a:srcRect l="11543" t="324" r="15165" b="88865"/>
           <a:stretch/>
         </p:blipFill>
@@ -3035,6 +3005,36 @@
           <a:xfrm>
             <a:off x="11097" y="8878"/>
             <a:ext cx="6858000" cy="716274"/>
+          </a:xfrm>
+          <a:prstGeom prst="rect">
+            <a:avLst/>
+          </a:prstGeom>
+        </p:spPr>
+      </p:pic>
+      <p:pic>
+        <p:nvPicPr>
+          <p:cNvPr id="4" name="Picture 3">
+            <a:extLst>
+              <a:ext uri="{FF2B5EF4-FFF2-40B4-BE49-F238E27FC236}">
+                <a16:creationId xmlns:a16="http://schemas.microsoft.com/office/drawing/2014/main" id="{5363C9C3-79D1-BC22-03AD-C0C101A5BAE7}"/>
+              </a:ext>
+            </a:extLst>
+          </p:cNvPr>
+          <p:cNvPicPr>
+            <a:picLocks noChangeAspect="1"/>
+          </p:cNvPicPr>
+          <p:nvPr/>
+        </p:nvPicPr>
+        <p:blipFill>
+          <a:blip r:embed="rId3"/>
+          <a:stretch>
+            <a:fillRect/>
+          </a:stretch>
+        </p:blipFill>
+        <p:spPr>
+          <a:xfrm>
+            <a:off x="22385" y="656096"/>
+            <a:ext cx="6858000" cy="6035040"/>
           </a:xfrm>
           <a:prstGeom prst="rect">
             <a:avLst/>

</xml_diff>